<commit_message>
Deployment system diagram is updated.
</commit_message>
<xml_diff>
--- a/deployment_system/imgs/deployment.pptx
+++ b/deployment_system/imgs/deployment.pptx
@@ -2,12 +2,12 @@
 <file path=ppt/presentation.xml><?xml version="1.0" encoding="utf-8"?>
 <p:presentation xmlns:a="http://schemas.openxmlformats.org/drawingml/2006/main" xmlns:r="http://schemas.openxmlformats.org/officeDocument/2006/relationships" xmlns:p="http://schemas.openxmlformats.org/presentationml/2006/main" saveSubsetFonts="1" autoCompressPictures="0">
   <p:sldMasterIdLst>
-    <p:sldMasterId id="2147483672" r:id="rId1"/>
+    <p:sldMasterId id="2147483684" r:id="rId1"/>
   </p:sldMasterIdLst>
   <p:sldIdLst>
     <p:sldId id="256" r:id="rId2"/>
   </p:sldIdLst>
-  <p:sldSz cx="7199313" cy="6119813"/>
+  <p:sldSz cx="8999538" cy="6119813"/>
   <p:notesSz cx="6858000" cy="9144000"/>
   <p:defaultTextStyle>
     <a:defPPr>
@@ -112,7 +112,7 @@
             <a:srgbClr val="A4A3A4"/>
           </p15:clr>
         </p15:guide>
-        <p15:guide id="2" pos="2268" userDrawn="1">
+        <p15:guide id="2" pos="2835" userDrawn="1">
           <p15:clr>
             <a:srgbClr val="A4A3A4"/>
           </p15:clr>
@@ -152,15 +152,15 @@
         </p:nvSpPr>
         <p:spPr>
           <a:xfrm>
-            <a:off x="539949" y="1001553"/>
-            <a:ext cx="6119416" cy="2130602"/>
+            <a:off x="674966" y="1001553"/>
+            <a:ext cx="7649607" cy="2130602"/>
           </a:xfrm>
         </p:spPr>
         <p:txBody>
           <a:bodyPr anchor="b"/>
           <a:lstStyle>
             <a:lvl1pPr algn="ctr">
-              <a:defRPr sz="4724"/>
+              <a:defRPr sz="5354"/>
             </a:lvl1pPr>
           </a:lstStyle>
           <a:p>
@@ -184,8 +184,8 @@
         </p:nvSpPr>
         <p:spPr>
           <a:xfrm>
-            <a:off x="899914" y="3214319"/>
-            <a:ext cx="5399485" cy="1477538"/>
+            <a:off x="1124942" y="3214319"/>
+            <a:ext cx="6749654" cy="1477538"/>
           </a:xfrm>
         </p:spPr>
         <p:txBody>
@@ -193,39 +193,39 @@
           <a:lstStyle>
             <a:lvl1pPr marL="0" indent="0" algn="ctr">
               <a:buNone/>
-              <a:defRPr sz="1890"/>
+              <a:defRPr sz="2142"/>
             </a:lvl1pPr>
-            <a:lvl2pPr marL="359954" indent="0" algn="ctr">
-              <a:buNone/>
-              <a:defRPr sz="1575"/>
+            <a:lvl2pPr marL="408005" indent="0" algn="ctr">
+              <a:buNone/>
+              <a:defRPr sz="1785"/>
             </a:lvl2pPr>
-            <a:lvl3pPr marL="719907" indent="0" algn="ctr">
-              <a:buNone/>
-              <a:defRPr sz="1417"/>
+            <a:lvl3pPr marL="816011" indent="0" algn="ctr">
+              <a:buNone/>
+              <a:defRPr sz="1606"/>
             </a:lvl3pPr>
-            <a:lvl4pPr marL="1079861" indent="0" algn="ctr">
-              <a:buNone/>
-              <a:defRPr sz="1260"/>
+            <a:lvl4pPr marL="1224016" indent="0" algn="ctr">
+              <a:buNone/>
+              <a:defRPr sz="1428"/>
             </a:lvl4pPr>
-            <a:lvl5pPr marL="1439814" indent="0" algn="ctr">
-              <a:buNone/>
-              <a:defRPr sz="1260"/>
+            <a:lvl5pPr marL="1632021" indent="0" algn="ctr">
+              <a:buNone/>
+              <a:defRPr sz="1428"/>
             </a:lvl5pPr>
-            <a:lvl6pPr marL="1799768" indent="0" algn="ctr">
-              <a:buNone/>
-              <a:defRPr sz="1260"/>
+            <a:lvl6pPr marL="2040026" indent="0" algn="ctr">
+              <a:buNone/>
+              <a:defRPr sz="1428"/>
             </a:lvl6pPr>
-            <a:lvl7pPr marL="2159721" indent="0" algn="ctr">
-              <a:buNone/>
-              <a:defRPr sz="1260"/>
+            <a:lvl7pPr marL="2448032" indent="0" algn="ctr">
+              <a:buNone/>
+              <a:defRPr sz="1428"/>
             </a:lvl7pPr>
-            <a:lvl8pPr marL="2519675" indent="0" algn="ctr">
-              <a:buNone/>
-              <a:defRPr sz="1260"/>
+            <a:lvl8pPr marL="2856037" indent="0" algn="ctr">
+              <a:buNone/>
+              <a:defRPr sz="1428"/>
             </a:lvl8pPr>
-            <a:lvl9pPr marL="2879628" indent="0" algn="ctr">
-              <a:buNone/>
-              <a:defRPr sz="1260"/>
+            <a:lvl9pPr marL="3264042" indent="0" algn="ctr">
+              <a:buNone/>
+              <a:defRPr sz="1428"/>
             </a:lvl9pPr>
           </a:lstStyle>
           <a:p>
@@ -305,7 +305,7 @@
     </p:spTree>
     <p:extLst>
       <p:ext uri="{BB962C8B-B14F-4D97-AF65-F5344CB8AC3E}">
-        <p14:creationId xmlns:p14="http://schemas.microsoft.com/office/powerpoint/2010/main" val="327193500"/>
+        <p14:creationId xmlns:p14="http://schemas.microsoft.com/office/powerpoint/2010/main" val="2145501895"/>
       </p:ext>
     </p:extLst>
   </p:cSld>
@@ -475,7 +475,7 @@
     </p:spTree>
     <p:extLst>
       <p:ext uri="{BB962C8B-B14F-4D97-AF65-F5344CB8AC3E}">
-        <p14:creationId xmlns:p14="http://schemas.microsoft.com/office/powerpoint/2010/main" val="1209251404"/>
+        <p14:creationId xmlns:p14="http://schemas.microsoft.com/office/powerpoint/2010/main" val="2124163010"/>
       </p:ext>
     </p:extLst>
   </p:cSld>
@@ -514,8 +514,8 @@
         </p:nvSpPr>
         <p:spPr>
           <a:xfrm>
-            <a:off x="5152009" y="325823"/>
-            <a:ext cx="1552352" cy="5186259"/>
+            <a:off x="6440295" y="325823"/>
+            <a:ext cx="1940525" cy="5186259"/>
           </a:xfrm>
         </p:spPr>
         <p:txBody>
@@ -542,8 +542,8 @@
         </p:nvSpPr>
         <p:spPr>
           <a:xfrm>
-            <a:off x="494953" y="325823"/>
-            <a:ext cx="4567064" cy="5186259"/>
+            <a:off x="618719" y="325823"/>
+            <a:ext cx="5709082" cy="5186259"/>
           </a:xfrm>
         </p:spPr>
         <p:txBody>
@@ -655,7 +655,7 @@
     </p:spTree>
     <p:extLst>
       <p:ext uri="{BB962C8B-B14F-4D97-AF65-F5344CB8AC3E}">
-        <p14:creationId xmlns:p14="http://schemas.microsoft.com/office/powerpoint/2010/main" val="103111820"/>
+        <p14:creationId xmlns:p14="http://schemas.microsoft.com/office/powerpoint/2010/main" val="1039561342"/>
       </p:ext>
     </p:extLst>
   </p:cSld>
@@ -825,7 +825,7 @@
     </p:spTree>
     <p:extLst>
       <p:ext uri="{BB962C8B-B14F-4D97-AF65-F5344CB8AC3E}">
-        <p14:creationId xmlns:p14="http://schemas.microsoft.com/office/powerpoint/2010/main" val="1583018180"/>
+        <p14:creationId xmlns:p14="http://schemas.microsoft.com/office/powerpoint/2010/main" val="1052432488"/>
       </p:ext>
     </p:extLst>
   </p:cSld>
@@ -864,15 +864,15 @@
         </p:nvSpPr>
         <p:spPr>
           <a:xfrm>
-            <a:off x="491204" y="1525705"/>
-            <a:ext cx="6209407" cy="2545672"/>
+            <a:off x="614031" y="1525705"/>
+            <a:ext cx="7762102" cy="2545672"/>
           </a:xfrm>
         </p:spPr>
         <p:txBody>
           <a:bodyPr anchor="b"/>
           <a:lstStyle>
             <a:lvl1pPr>
-              <a:defRPr sz="4724"/>
+              <a:defRPr sz="5354"/>
             </a:lvl1pPr>
           </a:lstStyle>
           <a:p>
@@ -896,8 +896,8 @@
         </p:nvSpPr>
         <p:spPr>
           <a:xfrm>
-            <a:off x="491204" y="4095460"/>
-            <a:ext cx="6209407" cy="1338709"/>
+            <a:off x="614031" y="4095460"/>
+            <a:ext cx="7762102" cy="1338709"/>
           </a:xfrm>
         </p:spPr>
         <p:txBody>
@@ -905,15 +905,15 @@
           <a:lstStyle>
             <a:lvl1pPr marL="0" indent="0">
               <a:buNone/>
-              <a:defRPr sz="1890">
+              <a:defRPr sz="2142">
                 <a:solidFill>
                   <a:schemeClr val="tx1"/>
                 </a:solidFill>
               </a:defRPr>
             </a:lvl1pPr>
-            <a:lvl2pPr marL="359954" indent="0">
-              <a:buNone/>
-              <a:defRPr sz="1575">
+            <a:lvl2pPr marL="408005" indent="0">
+              <a:buNone/>
+              <a:defRPr sz="1785">
                 <a:solidFill>
                   <a:schemeClr val="tx1">
                     <a:tint val="75000"/>
@@ -921,9 +921,9 @@
                 </a:solidFill>
               </a:defRPr>
             </a:lvl2pPr>
-            <a:lvl3pPr marL="719907" indent="0">
-              <a:buNone/>
-              <a:defRPr sz="1417">
+            <a:lvl3pPr marL="816011" indent="0">
+              <a:buNone/>
+              <a:defRPr sz="1606">
                 <a:solidFill>
                   <a:schemeClr val="tx1">
                     <a:tint val="75000"/>
@@ -931,9 +931,9 @@
                 </a:solidFill>
               </a:defRPr>
             </a:lvl3pPr>
-            <a:lvl4pPr marL="1079861" indent="0">
-              <a:buNone/>
-              <a:defRPr sz="1260">
+            <a:lvl4pPr marL="1224016" indent="0">
+              <a:buNone/>
+              <a:defRPr sz="1428">
                 <a:solidFill>
                   <a:schemeClr val="tx1">
                     <a:tint val="75000"/>
@@ -941,9 +941,9 @@
                 </a:solidFill>
               </a:defRPr>
             </a:lvl4pPr>
-            <a:lvl5pPr marL="1439814" indent="0">
-              <a:buNone/>
-              <a:defRPr sz="1260">
+            <a:lvl5pPr marL="1632021" indent="0">
+              <a:buNone/>
+              <a:defRPr sz="1428">
                 <a:solidFill>
                   <a:schemeClr val="tx1">
                     <a:tint val="75000"/>
@@ -951,9 +951,9 @@
                 </a:solidFill>
               </a:defRPr>
             </a:lvl5pPr>
-            <a:lvl6pPr marL="1799768" indent="0">
-              <a:buNone/>
-              <a:defRPr sz="1260">
+            <a:lvl6pPr marL="2040026" indent="0">
+              <a:buNone/>
+              <a:defRPr sz="1428">
                 <a:solidFill>
                   <a:schemeClr val="tx1">
                     <a:tint val="75000"/>
@@ -961,9 +961,9 @@
                 </a:solidFill>
               </a:defRPr>
             </a:lvl6pPr>
-            <a:lvl7pPr marL="2159721" indent="0">
-              <a:buNone/>
-              <a:defRPr sz="1260">
+            <a:lvl7pPr marL="2448032" indent="0">
+              <a:buNone/>
+              <a:defRPr sz="1428">
                 <a:solidFill>
                   <a:schemeClr val="tx1">
                     <a:tint val="75000"/>
@@ -971,9 +971,9 @@
                 </a:solidFill>
               </a:defRPr>
             </a:lvl7pPr>
-            <a:lvl8pPr marL="2519675" indent="0">
-              <a:buNone/>
-              <a:defRPr sz="1260">
+            <a:lvl8pPr marL="2856037" indent="0">
+              <a:buNone/>
+              <a:defRPr sz="1428">
                 <a:solidFill>
                   <a:schemeClr val="tx1">
                     <a:tint val="75000"/>
@@ -981,9 +981,9 @@
                 </a:solidFill>
               </a:defRPr>
             </a:lvl8pPr>
-            <a:lvl9pPr marL="2879628" indent="0">
-              <a:buNone/>
-              <a:defRPr sz="1260">
+            <a:lvl9pPr marL="3264042" indent="0">
+              <a:buNone/>
+              <a:defRPr sz="1428">
                 <a:solidFill>
                   <a:schemeClr val="tx1">
                     <a:tint val="75000"/>
@@ -1069,7 +1069,7 @@
     </p:spTree>
     <p:extLst>
       <p:ext uri="{BB962C8B-B14F-4D97-AF65-F5344CB8AC3E}">
-        <p14:creationId xmlns:p14="http://schemas.microsoft.com/office/powerpoint/2010/main" val="611648577"/>
+        <p14:creationId xmlns:p14="http://schemas.microsoft.com/office/powerpoint/2010/main" val="1557509124"/>
       </p:ext>
     </p:extLst>
   </p:cSld>
@@ -1131,8 +1131,8 @@
         </p:nvSpPr>
         <p:spPr>
           <a:xfrm>
-            <a:off x="494953" y="1629117"/>
-            <a:ext cx="3059708" cy="3882965"/>
+            <a:off x="618718" y="1629117"/>
+            <a:ext cx="3824804" cy="3882965"/>
           </a:xfrm>
         </p:spPr>
         <p:txBody>
@@ -1188,8 +1188,8 @@
         </p:nvSpPr>
         <p:spPr>
           <a:xfrm>
-            <a:off x="3644652" y="1629117"/>
-            <a:ext cx="3059708" cy="3882965"/>
+            <a:off x="4556016" y="1629117"/>
+            <a:ext cx="3824804" cy="3882965"/>
           </a:xfrm>
         </p:spPr>
         <p:txBody>
@@ -1301,7 +1301,7 @@
     </p:spTree>
     <p:extLst>
       <p:ext uri="{BB962C8B-B14F-4D97-AF65-F5344CB8AC3E}">
-        <p14:creationId xmlns:p14="http://schemas.microsoft.com/office/powerpoint/2010/main" val="2120899097"/>
+        <p14:creationId xmlns:p14="http://schemas.microsoft.com/office/powerpoint/2010/main" val="1377673785"/>
       </p:ext>
     </p:extLst>
   </p:cSld>
@@ -1340,8 +1340,8 @@
         </p:nvSpPr>
         <p:spPr>
           <a:xfrm>
-            <a:off x="495891" y="325825"/>
-            <a:ext cx="6209407" cy="1182881"/>
+            <a:off x="619890" y="325825"/>
+            <a:ext cx="7762102" cy="1182881"/>
           </a:xfrm>
         </p:spPr>
         <p:txBody>
@@ -1368,8 +1368,8 @@
         </p:nvSpPr>
         <p:spPr>
           <a:xfrm>
-            <a:off x="495891" y="1500205"/>
-            <a:ext cx="3045646" cy="735227"/>
+            <a:off x="619891" y="1500205"/>
+            <a:ext cx="3807226" cy="735227"/>
           </a:xfrm>
         </p:spPr>
         <p:txBody>
@@ -1377,39 +1377,39 @@
           <a:lstStyle>
             <a:lvl1pPr marL="0" indent="0">
               <a:buNone/>
-              <a:defRPr sz="1890" b="1"/>
+              <a:defRPr sz="2142" b="1"/>
             </a:lvl1pPr>
-            <a:lvl2pPr marL="359954" indent="0">
-              <a:buNone/>
-              <a:defRPr sz="1575" b="1"/>
+            <a:lvl2pPr marL="408005" indent="0">
+              <a:buNone/>
+              <a:defRPr sz="1785" b="1"/>
             </a:lvl2pPr>
-            <a:lvl3pPr marL="719907" indent="0">
-              <a:buNone/>
-              <a:defRPr sz="1417" b="1"/>
+            <a:lvl3pPr marL="816011" indent="0">
+              <a:buNone/>
+              <a:defRPr sz="1606" b="1"/>
             </a:lvl3pPr>
-            <a:lvl4pPr marL="1079861" indent="0">
-              <a:buNone/>
-              <a:defRPr sz="1260" b="1"/>
+            <a:lvl4pPr marL="1224016" indent="0">
+              <a:buNone/>
+              <a:defRPr sz="1428" b="1"/>
             </a:lvl4pPr>
-            <a:lvl5pPr marL="1439814" indent="0">
-              <a:buNone/>
-              <a:defRPr sz="1260" b="1"/>
+            <a:lvl5pPr marL="1632021" indent="0">
+              <a:buNone/>
+              <a:defRPr sz="1428" b="1"/>
             </a:lvl5pPr>
-            <a:lvl6pPr marL="1799768" indent="0">
-              <a:buNone/>
-              <a:defRPr sz="1260" b="1"/>
+            <a:lvl6pPr marL="2040026" indent="0">
+              <a:buNone/>
+              <a:defRPr sz="1428" b="1"/>
             </a:lvl6pPr>
-            <a:lvl7pPr marL="2159721" indent="0">
-              <a:buNone/>
-              <a:defRPr sz="1260" b="1"/>
+            <a:lvl7pPr marL="2448032" indent="0">
+              <a:buNone/>
+              <a:defRPr sz="1428" b="1"/>
             </a:lvl7pPr>
-            <a:lvl8pPr marL="2519675" indent="0">
-              <a:buNone/>
-              <a:defRPr sz="1260" b="1"/>
+            <a:lvl8pPr marL="2856037" indent="0">
+              <a:buNone/>
+              <a:defRPr sz="1428" b="1"/>
             </a:lvl8pPr>
-            <a:lvl9pPr marL="2879628" indent="0">
-              <a:buNone/>
-              <a:defRPr sz="1260" b="1"/>
+            <a:lvl9pPr marL="3264042" indent="0">
+              <a:buNone/>
+              <a:defRPr sz="1428" b="1"/>
             </a:lvl9pPr>
           </a:lstStyle>
           <a:p>
@@ -1433,8 +1433,8 @@
         </p:nvSpPr>
         <p:spPr>
           <a:xfrm>
-            <a:off x="495891" y="2235432"/>
-            <a:ext cx="3045646" cy="3287983"/>
+            <a:off x="619891" y="2235432"/>
+            <a:ext cx="3807226" cy="3287983"/>
           </a:xfrm>
         </p:spPr>
         <p:txBody>
@@ -1490,8 +1490,8 @@
         </p:nvSpPr>
         <p:spPr>
           <a:xfrm>
-            <a:off x="3644652" y="1500205"/>
-            <a:ext cx="3060646" cy="735227"/>
+            <a:off x="4556017" y="1500205"/>
+            <a:ext cx="3825976" cy="735227"/>
           </a:xfrm>
         </p:spPr>
         <p:txBody>
@@ -1499,39 +1499,39 @@
           <a:lstStyle>
             <a:lvl1pPr marL="0" indent="0">
               <a:buNone/>
-              <a:defRPr sz="1890" b="1"/>
+              <a:defRPr sz="2142" b="1"/>
             </a:lvl1pPr>
-            <a:lvl2pPr marL="359954" indent="0">
-              <a:buNone/>
-              <a:defRPr sz="1575" b="1"/>
+            <a:lvl2pPr marL="408005" indent="0">
+              <a:buNone/>
+              <a:defRPr sz="1785" b="1"/>
             </a:lvl2pPr>
-            <a:lvl3pPr marL="719907" indent="0">
-              <a:buNone/>
-              <a:defRPr sz="1417" b="1"/>
+            <a:lvl3pPr marL="816011" indent="0">
+              <a:buNone/>
+              <a:defRPr sz="1606" b="1"/>
             </a:lvl3pPr>
-            <a:lvl4pPr marL="1079861" indent="0">
-              <a:buNone/>
-              <a:defRPr sz="1260" b="1"/>
+            <a:lvl4pPr marL="1224016" indent="0">
+              <a:buNone/>
+              <a:defRPr sz="1428" b="1"/>
             </a:lvl4pPr>
-            <a:lvl5pPr marL="1439814" indent="0">
-              <a:buNone/>
-              <a:defRPr sz="1260" b="1"/>
+            <a:lvl5pPr marL="1632021" indent="0">
+              <a:buNone/>
+              <a:defRPr sz="1428" b="1"/>
             </a:lvl5pPr>
-            <a:lvl6pPr marL="1799768" indent="0">
-              <a:buNone/>
-              <a:defRPr sz="1260" b="1"/>
+            <a:lvl6pPr marL="2040026" indent="0">
+              <a:buNone/>
+              <a:defRPr sz="1428" b="1"/>
             </a:lvl6pPr>
-            <a:lvl7pPr marL="2159721" indent="0">
-              <a:buNone/>
-              <a:defRPr sz="1260" b="1"/>
+            <a:lvl7pPr marL="2448032" indent="0">
+              <a:buNone/>
+              <a:defRPr sz="1428" b="1"/>
             </a:lvl7pPr>
-            <a:lvl8pPr marL="2519675" indent="0">
-              <a:buNone/>
-              <a:defRPr sz="1260" b="1"/>
+            <a:lvl8pPr marL="2856037" indent="0">
+              <a:buNone/>
+              <a:defRPr sz="1428" b="1"/>
             </a:lvl8pPr>
-            <a:lvl9pPr marL="2879628" indent="0">
-              <a:buNone/>
-              <a:defRPr sz="1260" b="1"/>
+            <a:lvl9pPr marL="3264042" indent="0">
+              <a:buNone/>
+              <a:defRPr sz="1428" b="1"/>
             </a:lvl9pPr>
           </a:lstStyle>
           <a:p>
@@ -1555,8 +1555,8 @@
         </p:nvSpPr>
         <p:spPr>
           <a:xfrm>
-            <a:off x="3644652" y="2235432"/>
-            <a:ext cx="3060646" cy="3287983"/>
+            <a:off x="4556017" y="2235432"/>
+            <a:ext cx="3825976" cy="3287983"/>
           </a:xfrm>
         </p:spPr>
         <p:txBody>
@@ -1668,7 +1668,7 @@
     </p:spTree>
     <p:extLst>
       <p:ext uri="{BB962C8B-B14F-4D97-AF65-F5344CB8AC3E}">
-        <p14:creationId xmlns:p14="http://schemas.microsoft.com/office/powerpoint/2010/main" val="2017550373"/>
+        <p14:creationId xmlns:p14="http://schemas.microsoft.com/office/powerpoint/2010/main" val="394622541"/>
       </p:ext>
     </p:extLst>
   </p:cSld>
@@ -1786,7 +1786,7 @@
     </p:spTree>
     <p:extLst>
       <p:ext uri="{BB962C8B-B14F-4D97-AF65-F5344CB8AC3E}">
-        <p14:creationId xmlns:p14="http://schemas.microsoft.com/office/powerpoint/2010/main" val="202332881"/>
+        <p14:creationId xmlns:p14="http://schemas.microsoft.com/office/powerpoint/2010/main" val="991544651"/>
       </p:ext>
     </p:extLst>
   </p:cSld>
@@ -1881,7 +1881,7 @@
     </p:spTree>
     <p:extLst>
       <p:ext uri="{BB962C8B-B14F-4D97-AF65-F5344CB8AC3E}">
-        <p14:creationId xmlns:p14="http://schemas.microsoft.com/office/powerpoint/2010/main" val="1142117766"/>
+        <p14:creationId xmlns:p14="http://schemas.microsoft.com/office/powerpoint/2010/main" val="417848637"/>
       </p:ext>
     </p:extLst>
   </p:cSld>
@@ -1920,15 +1920,15 @@
         </p:nvSpPr>
         <p:spPr>
           <a:xfrm>
-            <a:off x="495890" y="407988"/>
-            <a:ext cx="2321966" cy="1427956"/>
+            <a:off x="619891" y="407988"/>
+            <a:ext cx="2902585" cy="1427956"/>
           </a:xfrm>
         </p:spPr>
         <p:txBody>
           <a:bodyPr anchor="b"/>
           <a:lstStyle>
             <a:lvl1pPr>
-              <a:defRPr sz="2519"/>
+              <a:defRPr sz="2856"/>
             </a:lvl1pPr>
           </a:lstStyle>
           <a:p>
@@ -1952,39 +1952,39 @@
         </p:nvSpPr>
         <p:spPr>
           <a:xfrm>
-            <a:off x="3060646" y="881141"/>
-            <a:ext cx="3644652" cy="4349034"/>
+            <a:off x="3825976" y="881141"/>
+            <a:ext cx="4556016" cy="4349034"/>
           </a:xfrm>
         </p:spPr>
         <p:txBody>
           <a:bodyPr/>
           <a:lstStyle>
             <a:lvl1pPr>
-              <a:defRPr sz="2519"/>
+              <a:defRPr sz="2856"/>
             </a:lvl1pPr>
             <a:lvl2pPr>
-              <a:defRPr sz="2204"/>
+              <a:defRPr sz="2499"/>
             </a:lvl2pPr>
             <a:lvl3pPr>
-              <a:defRPr sz="1890"/>
+              <a:defRPr sz="2142"/>
             </a:lvl3pPr>
             <a:lvl4pPr>
-              <a:defRPr sz="1575"/>
+              <a:defRPr sz="1785"/>
             </a:lvl4pPr>
             <a:lvl5pPr>
-              <a:defRPr sz="1575"/>
+              <a:defRPr sz="1785"/>
             </a:lvl5pPr>
             <a:lvl6pPr>
-              <a:defRPr sz="1575"/>
+              <a:defRPr sz="1785"/>
             </a:lvl6pPr>
             <a:lvl7pPr>
-              <a:defRPr sz="1575"/>
+              <a:defRPr sz="1785"/>
             </a:lvl7pPr>
             <a:lvl8pPr>
-              <a:defRPr sz="1575"/>
+              <a:defRPr sz="1785"/>
             </a:lvl8pPr>
             <a:lvl9pPr>
-              <a:defRPr sz="1575"/>
+              <a:defRPr sz="1785"/>
             </a:lvl9pPr>
           </a:lstStyle>
           <a:p>
@@ -2037,8 +2037,8 @@
         </p:nvSpPr>
         <p:spPr>
           <a:xfrm>
-            <a:off x="495890" y="1835944"/>
-            <a:ext cx="2321966" cy="3401313"/>
+            <a:off x="619891" y="1835944"/>
+            <a:ext cx="2902585" cy="3401313"/>
           </a:xfrm>
         </p:spPr>
         <p:txBody>
@@ -2046,39 +2046,39 @@
           <a:lstStyle>
             <a:lvl1pPr marL="0" indent="0">
               <a:buNone/>
-              <a:defRPr sz="1260"/>
+              <a:defRPr sz="1428"/>
             </a:lvl1pPr>
-            <a:lvl2pPr marL="359954" indent="0">
-              <a:buNone/>
-              <a:defRPr sz="1102"/>
+            <a:lvl2pPr marL="408005" indent="0">
+              <a:buNone/>
+              <a:defRPr sz="1249"/>
             </a:lvl2pPr>
-            <a:lvl3pPr marL="719907" indent="0">
-              <a:buNone/>
-              <a:defRPr sz="945"/>
+            <a:lvl3pPr marL="816011" indent="0">
+              <a:buNone/>
+              <a:defRPr sz="1071"/>
             </a:lvl3pPr>
-            <a:lvl4pPr marL="1079861" indent="0">
-              <a:buNone/>
-              <a:defRPr sz="787"/>
+            <a:lvl4pPr marL="1224016" indent="0">
+              <a:buNone/>
+              <a:defRPr sz="892"/>
             </a:lvl4pPr>
-            <a:lvl5pPr marL="1439814" indent="0">
-              <a:buNone/>
-              <a:defRPr sz="787"/>
+            <a:lvl5pPr marL="1632021" indent="0">
+              <a:buNone/>
+              <a:defRPr sz="892"/>
             </a:lvl5pPr>
-            <a:lvl6pPr marL="1799768" indent="0">
-              <a:buNone/>
-              <a:defRPr sz="787"/>
+            <a:lvl6pPr marL="2040026" indent="0">
+              <a:buNone/>
+              <a:defRPr sz="892"/>
             </a:lvl6pPr>
-            <a:lvl7pPr marL="2159721" indent="0">
-              <a:buNone/>
-              <a:defRPr sz="787"/>
+            <a:lvl7pPr marL="2448032" indent="0">
+              <a:buNone/>
+              <a:defRPr sz="892"/>
             </a:lvl7pPr>
-            <a:lvl8pPr marL="2519675" indent="0">
-              <a:buNone/>
-              <a:defRPr sz="787"/>
+            <a:lvl8pPr marL="2856037" indent="0">
+              <a:buNone/>
+              <a:defRPr sz="892"/>
             </a:lvl8pPr>
-            <a:lvl9pPr marL="2879628" indent="0">
-              <a:buNone/>
-              <a:defRPr sz="787"/>
+            <a:lvl9pPr marL="3264042" indent="0">
+              <a:buNone/>
+              <a:defRPr sz="892"/>
             </a:lvl9pPr>
           </a:lstStyle>
           <a:p>
@@ -2158,7 +2158,7 @@
     </p:spTree>
     <p:extLst>
       <p:ext uri="{BB962C8B-B14F-4D97-AF65-F5344CB8AC3E}">
-        <p14:creationId xmlns:p14="http://schemas.microsoft.com/office/powerpoint/2010/main" val="1364456276"/>
+        <p14:creationId xmlns:p14="http://schemas.microsoft.com/office/powerpoint/2010/main" val="510516369"/>
       </p:ext>
     </p:extLst>
   </p:cSld>
@@ -2197,15 +2197,15 @@
         </p:nvSpPr>
         <p:spPr>
           <a:xfrm>
-            <a:off x="495890" y="407988"/>
-            <a:ext cx="2321966" cy="1427956"/>
+            <a:off x="619891" y="407988"/>
+            <a:ext cx="2902585" cy="1427956"/>
           </a:xfrm>
         </p:spPr>
         <p:txBody>
           <a:bodyPr anchor="b"/>
           <a:lstStyle>
             <a:lvl1pPr>
-              <a:defRPr sz="2519"/>
+              <a:defRPr sz="2856"/>
             </a:lvl1pPr>
           </a:lstStyle>
           <a:p>
@@ -2229,8 +2229,8 @@
         </p:nvSpPr>
         <p:spPr>
           <a:xfrm>
-            <a:off x="3060646" y="881141"/>
-            <a:ext cx="3644652" cy="4349034"/>
+            <a:off x="3825976" y="881141"/>
+            <a:ext cx="4556016" cy="4349034"/>
           </a:xfrm>
         </p:spPr>
         <p:txBody>
@@ -2238,39 +2238,39 @@
           <a:lstStyle>
             <a:lvl1pPr marL="0" indent="0">
               <a:buNone/>
-              <a:defRPr sz="2519"/>
+              <a:defRPr sz="2856"/>
             </a:lvl1pPr>
-            <a:lvl2pPr marL="359954" indent="0">
-              <a:buNone/>
-              <a:defRPr sz="2204"/>
+            <a:lvl2pPr marL="408005" indent="0">
+              <a:buNone/>
+              <a:defRPr sz="2499"/>
             </a:lvl2pPr>
-            <a:lvl3pPr marL="719907" indent="0">
-              <a:buNone/>
-              <a:defRPr sz="1890"/>
+            <a:lvl3pPr marL="816011" indent="0">
+              <a:buNone/>
+              <a:defRPr sz="2142"/>
             </a:lvl3pPr>
-            <a:lvl4pPr marL="1079861" indent="0">
-              <a:buNone/>
-              <a:defRPr sz="1575"/>
+            <a:lvl4pPr marL="1224016" indent="0">
+              <a:buNone/>
+              <a:defRPr sz="1785"/>
             </a:lvl4pPr>
-            <a:lvl5pPr marL="1439814" indent="0">
-              <a:buNone/>
-              <a:defRPr sz="1575"/>
+            <a:lvl5pPr marL="1632021" indent="0">
+              <a:buNone/>
+              <a:defRPr sz="1785"/>
             </a:lvl5pPr>
-            <a:lvl6pPr marL="1799768" indent="0">
-              <a:buNone/>
-              <a:defRPr sz="1575"/>
+            <a:lvl6pPr marL="2040026" indent="0">
+              <a:buNone/>
+              <a:defRPr sz="1785"/>
             </a:lvl6pPr>
-            <a:lvl7pPr marL="2159721" indent="0">
-              <a:buNone/>
-              <a:defRPr sz="1575"/>
+            <a:lvl7pPr marL="2448032" indent="0">
+              <a:buNone/>
+              <a:defRPr sz="1785"/>
             </a:lvl7pPr>
-            <a:lvl8pPr marL="2519675" indent="0">
-              <a:buNone/>
-              <a:defRPr sz="1575"/>
+            <a:lvl8pPr marL="2856037" indent="0">
+              <a:buNone/>
+              <a:defRPr sz="1785"/>
             </a:lvl8pPr>
-            <a:lvl9pPr marL="2879628" indent="0">
-              <a:buNone/>
-              <a:defRPr sz="1575"/>
+            <a:lvl9pPr marL="3264042" indent="0">
+              <a:buNone/>
+              <a:defRPr sz="1785"/>
             </a:lvl9pPr>
           </a:lstStyle>
           <a:p>
@@ -2294,8 +2294,8 @@
         </p:nvSpPr>
         <p:spPr>
           <a:xfrm>
-            <a:off x="495890" y="1835944"/>
-            <a:ext cx="2321966" cy="3401313"/>
+            <a:off x="619891" y="1835944"/>
+            <a:ext cx="2902585" cy="3401313"/>
           </a:xfrm>
         </p:spPr>
         <p:txBody>
@@ -2303,39 +2303,39 @@
           <a:lstStyle>
             <a:lvl1pPr marL="0" indent="0">
               <a:buNone/>
-              <a:defRPr sz="1260"/>
+              <a:defRPr sz="1428"/>
             </a:lvl1pPr>
-            <a:lvl2pPr marL="359954" indent="0">
-              <a:buNone/>
-              <a:defRPr sz="1102"/>
+            <a:lvl2pPr marL="408005" indent="0">
+              <a:buNone/>
+              <a:defRPr sz="1249"/>
             </a:lvl2pPr>
-            <a:lvl3pPr marL="719907" indent="0">
-              <a:buNone/>
-              <a:defRPr sz="945"/>
+            <a:lvl3pPr marL="816011" indent="0">
+              <a:buNone/>
+              <a:defRPr sz="1071"/>
             </a:lvl3pPr>
-            <a:lvl4pPr marL="1079861" indent="0">
-              <a:buNone/>
-              <a:defRPr sz="787"/>
+            <a:lvl4pPr marL="1224016" indent="0">
+              <a:buNone/>
+              <a:defRPr sz="892"/>
             </a:lvl4pPr>
-            <a:lvl5pPr marL="1439814" indent="0">
-              <a:buNone/>
-              <a:defRPr sz="787"/>
+            <a:lvl5pPr marL="1632021" indent="0">
+              <a:buNone/>
+              <a:defRPr sz="892"/>
             </a:lvl5pPr>
-            <a:lvl6pPr marL="1799768" indent="0">
-              <a:buNone/>
-              <a:defRPr sz="787"/>
+            <a:lvl6pPr marL="2040026" indent="0">
+              <a:buNone/>
+              <a:defRPr sz="892"/>
             </a:lvl6pPr>
-            <a:lvl7pPr marL="2159721" indent="0">
-              <a:buNone/>
-              <a:defRPr sz="787"/>
+            <a:lvl7pPr marL="2448032" indent="0">
+              <a:buNone/>
+              <a:defRPr sz="892"/>
             </a:lvl7pPr>
-            <a:lvl8pPr marL="2519675" indent="0">
-              <a:buNone/>
-              <a:defRPr sz="787"/>
+            <a:lvl8pPr marL="2856037" indent="0">
+              <a:buNone/>
+              <a:defRPr sz="892"/>
             </a:lvl8pPr>
-            <a:lvl9pPr marL="2879628" indent="0">
-              <a:buNone/>
-              <a:defRPr sz="787"/>
+            <a:lvl9pPr marL="3264042" indent="0">
+              <a:buNone/>
+              <a:defRPr sz="892"/>
             </a:lvl9pPr>
           </a:lstStyle>
           <a:p>
@@ -2415,7 +2415,7 @@
     </p:spTree>
     <p:extLst>
       <p:ext uri="{BB962C8B-B14F-4D97-AF65-F5344CB8AC3E}">
-        <p14:creationId xmlns:p14="http://schemas.microsoft.com/office/powerpoint/2010/main" val="1586248066"/>
+        <p14:creationId xmlns:p14="http://schemas.microsoft.com/office/powerpoint/2010/main" val="1051444018"/>
       </p:ext>
     </p:extLst>
   </p:cSld>
@@ -2459,8 +2459,8 @@
         </p:nvSpPr>
         <p:spPr>
           <a:xfrm>
-            <a:off x="494953" y="325825"/>
-            <a:ext cx="6209407" cy="1182881"/>
+            <a:off x="618718" y="325825"/>
+            <a:ext cx="7762102" cy="1182881"/>
           </a:xfrm>
           <a:prstGeom prst="rect">
             <a:avLst/>
@@ -2492,8 +2492,8 @@
         </p:nvSpPr>
         <p:spPr>
           <a:xfrm>
-            <a:off x="494953" y="1629117"/>
-            <a:ext cx="6209407" cy="3882965"/>
+            <a:off x="618718" y="1629117"/>
+            <a:ext cx="7762102" cy="3882965"/>
           </a:xfrm>
           <a:prstGeom prst="rect">
             <a:avLst/>
@@ -2554,8 +2554,8 @@
         </p:nvSpPr>
         <p:spPr>
           <a:xfrm>
-            <a:off x="494953" y="5672162"/>
-            <a:ext cx="1619845" cy="325823"/>
+            <a:off x="618718" y="5672162"/>
+            <a:ext cx="2024896" cy="325823"/>
           </a:xfrm>
           <a:prstGeom prst="rect">
             <a:avLst/>
@@ -2565,7 +2565,7 @@
           <a:bodyPr vert="horz" lIns="91440" tIns="45720" rIns="91440" bIns="45720" rtlCol="0" anchor="ctr"/>
           <a:lstStyle>
             <a:lvl1pPr algn="l">
-              <a:defRPr sz="945">
+              <a:defRPr sz="1071">
                 <a:solidFill>
                   <a:schemeClr val="tx1">
                     <a:tint val="75000"/>
@@ -2595,8 +2595,8 @@
         </p:nvSpPr>
         <p:spPr>
           <a:xfrm>
-            <a:off x="2384773" y="5672162"/>
-            <a:ext cx="2429768" cy="325823"/>
+            <a:off x="2981097" y="5672162"/>
+            <a:ext cx="3037344" cy="325823"/>
           </a:xfrm>
           <a:prstGeom prst="rect">
             <a:avLst/>
@@ -2606,7 +2606,7 @@
           <a:bodyPr vert="horz" lIns="91440" tIns="45720" rIns="91440" bIns="45720" rtlCol="0" anchor="ctr"/>
           <a:lstStyle>
             <a:lvl1pPr algn="ctr">
-              <a:defRPr sz="945">
+              <a:defRPr sz="1071">
                 <a:solidFill>
                   <a:schemeClr val="tx1">
                     <a:tint val="75000"/>
@@ -2632,8 +2632,8 @@
         </p:nvSpPr>
         <p:spPr>
           <a:xfrm>
-            <a:off x="5084515" y="5672162"/>
-            <a:ext cx="1619845" cy="325823"/>
+            <a:off x="6355924" y="5672162"/>
+            <a:ext cx="2024896" cy="325823"/>
           </a:xfrm>
           <a:prstGeom prst="rect">
             <a:avLst/>
@@ -2643,7 +2643,7 @@
           <a:bodyPr vert="horz" lIns="91440" tIns="45720" rIns="91440" bIns="45720" rtlCol="0" anchor="ctr"/>
           <a:lstStyle>
             <a:lvl1pPr algn="r">
-              <a:defRPr sz="945">
+              <a:defRPr sz="1071">
                 <a:solidFill>
                   <a:schemeClr val="tx1">
                     <a:tint val="75000"/>
@@ -2664,27 +2664,27 @@
     </p:spTree>
     <p:extLst>
       <p:ext uri="{BB962C8B-B14F-4D97-AF65-F5344CB8AC3E}">
-        <p14:creationId xmlns:p14="http://schemas.microsoft.com/office/powerpoint/2010/main" val="275881739"/>
+        <p14:creationId xmlns:p14="http://schemas.microsoft.com/office/powerpoint/2010/main" val="446694880"/>
       </p:ext>
     </p:extLst>
   </p:cSld>
   <p:clrMap bg1="lt1" tx1="dk1" bg2="lt2" tx2="dk2" accent1="accent1" accent2="accent2" accent3="accent3" accent4="accent4" accent5="accent5" accent6="accent6" hlink="hlink" folHlink="folHlink"/>
   <p:sldLayoutIdLst>
-    <p:sldLayoutId id="2147483673" r:id="rId1"/>
-    <p:sldLayoutId id="2147483674" r:id="rId2"/>
-    <p:sldLayoutId id="2147483675" r:id="rId3"/>
-    <p:sldLayoutId id="2147483676" r:id="rId4"/>
-    <p:sldLayoutId id="2147483677" r:id="rId5"/>
-    <p:sldLayoutId id="2147483678" r:id="rId6"/>
-    <p:sldLayoutId id="2147483679" r:id="rId7"/>
-    <p:sldLayoutId id="2147483680" r:id="rId8"/>
-    <p:sldLayoutId id="2147483681" r:id="rId9"/>
-    <p:sldLayoutId id="2147483682" r:id="rId10"/>
-    <p:sldLayoutId id="2147483683" r:id="rId11"/>
+    <p:sldLayoutId id="2147483685" r:id="rId1"/>
+    <p:sldLayoutId id="2147483686" r:id="rId2"/>
+    <p:sldLayoutId id="2147483687" r:id="rId3"/>
+    <p:sldLayoutId id="2147483688" r:id="rId4"/>
+    <p:sldLayoutId id="2147483689" r:id="rId5"/>
+    <p:sldLayoutId id="2147483690" r:id="rId6"/>
+    <p:sldLayoutId id="2147483691" r:id="rId7"/>
+    <p:sldLayoutId id="2147483692" r:id="rId8"/>
+    <p:sldLayoutId id="2147483693" r:id="rId9"/>
+    <p:sldLayoutId id="2147483694" r:id="rId10"/>
+    <p:sldLayoutId id="2147483695" r:id="rId11"/>
   </p:sldLayoutIdLst>
   <p:txStyles>
     <p:titleStyle>
-      <a:lvl1pPr algn="l" defTabSz="719907" rtl="0" eaLnBrk="1" latinLnBrk="0" hangingPunct="1">
+      <a:lvl1pPr algn="l" defTabSz="816011" rtl="0" eaLnBrk="1" latinLnBrk="0" hangingPunct="1">
         <a:lnSpc>
           <a:spcPct val="90000"/>
         </a:lnSpc>
@@ -2692,7 +2692,7 @@
           <a:spcPct val="0"/>
         </a:spcBef>
         <a:buNone/>
-        <a:defRPr sz="3464" kern="1200">
+        <a:defRPr sz="3927" kern="1200">
           <a:solidFill>
             <a:schemeClr val="tx1"/>
           </a:solidFill>
@@ -2703,16 +2703,16 @@
       </a:lvl1pPr>
     </p:titleStyle>
     <p:bodyStyle>
-      <a:lvl1pPr marL="179977" indent="-179977" algn="l" defTabSz="719907" rtl="0" eaLnBrk="1" latinLnBrk="0" hangingPunct="1">
+      <a:lvl1pPr marL="204003" indent="-204003" algn="l" defTabSz="816011" rtl="0" eaLnBrk="1" latinLnBrk="0" hangingPunct="1">
         <a:lnSpc>
           <a:spcPct val="90000"/>
         </a:lnSpc>
         <a:spcBef>
-          <a:spcPts val="787"/>
+          <a:spcPts val="892"/>
         </a:spcBef>
         <a:buFont typeface="Arial" panose="020B0604020202020204" pitchFamily="34" charset="0"/>
         <a:buChar char="•"/>
-        <a:defRPr sz="2204" kern="1200">
+        <a:defRPr sz="2499" kern="1200">
           <a:solidFill>
             <a:schemeClr val="tx1"/>
           </a:solidFill>
@@ -2721,16 +2721,16 @@
           <a:cs typeface="+mn-cs"/>
         </a:defRPr>
       </a:lvl1pPr>
-      <a:lvl2pPr marL="539930" indent="-179977" algn="l" defTabSz="719907" rtl="0" eaLnBrk="1" latinLnBrk="0" hangingPunct="1">
+      <a:lvl2pPr marL="612008" indent="-204003" algn="l" defTabSz="816011" rtl="0" eaLnBrk="1" latinLnBrk="0" hangingPunct="1">
         <a:lnSpc>
           <a:spcPct val="90000"/>
         </a:lnSpc>
         <a:spcBef>
-          <a:spcPts val="394"/>
+          <a:spcPts val="446"/>
         </a:spcBef>
         <a:buFont typeface="Arial" panose="020B0604020202020204" pitchFamily="34" charset="0"/>
         <a:buChar char="•"/>
-        <a:defRPr sz="1890" kern="1200">
+        <a:defRPr sz="2142" kern="1200">
           <a:solidFill>
             <a:schemeClr val="tx1"/>
           </a:solidFill>
@@ -2739,16 +2739,16 @@
           <a:cs typeface="+mn-cs"/>
         </a:defRPr>
       </a:lvl2pPr>
-      <a:lvl3pPr marL="899884" indent="-179977" algn="l" defTabSz="719907" rtl="0" eaLnBrk="1" latinLnBrk="0" hangingPunct="1">
+      <a:lvl3pPr marL="1020013" indent="-204003" algn="l" defTabSz="816011" rtl="0" eaLnBrk="1" latinLnBrk="0" hangingPunct="1">
         <a:lnSpc>
           <a:spcPct val="90000"/>
         </a:lnSpc>
         <a:spcBef>
-          <a:spcPts val="394"/>
+          <a:spcPts val="446"/>
         </a:spcBef>
         <a:buFont typeface="Arial" panose="020B0604020202020204" pitchFamily="34" charset="0"/>
         <a:buChar char="•"/>
-        <a:defRPr sz="1575" kern="1200">
+        <a:defRPr sz="1785" kern="1200">
           <a:solidFill>
             <a:schemeClr val="tx1"/>
           </a:solidFill>
@@ -2757,16 +2757,16 @@
           <a:cs typeface="+mn-cs"/>
         </a:defRPr>
       </a:lvl3pPr>
-      <a:lvl4pPr marL="1259837" indent="-179977" algn="l" defTabSz="719907" rtl="0" eaLnBrk="1" latinLnBrk="0" hangingPunct="1">
+      <a:lvl4pPr marL="1428018" indent="-204003" algn="l" defTabSz="816011" rtl="0" eaLnBrk="1" latinLnBrk="0" hangingPunct="1">
         <a:lnSpc>
           <a:spcPct val="90000"/>
         </a:lnSpc>
         <a:spcBef>
-          <a:spcPts val="394"/>
+          <a:spcPts val="446"/>
         </a:spcBef>
         <a:buFont typeface="Arial" panose="020B0604020202020204" pitchFamily="34" charset="0"/>
         <a:buChar char="•"/>
-        <a:defRPr sz="1417" kern="1200">
+        <a:defRPr sz="1606" kern="1200">
           <a:solidFill>
             <a:schemeClr val="tx1"/>
           </a:solidFill>
@@ -2775,16 +2775,16 @@
           <a:cs typeface="+mn-cs"/>
         </a:defRPr>
       </a:lvl4pPr>
-      <a:lvl5pPr marL="1619791" indent="-179977" algn="l" defTabSz="719907" rtl="0" eaLnBrk="1" latinLnBrk="0" hangingPunct="1">
+      <a:lvl5pPr marL="1836024" indent="-204003" algn="l" defTabSz="816011" rtl="0" eaLnBrk="1" latinLnBrk="0" hangingPunct="1">
         <a:lnSpc>
           <a:spcPct val="90000"/>
         </a:lnSpc>
         <a:spcBef>
-          <a:spcPts val="394"/>
+          <a:spcPts val="446"/>
         </a:spcBef>
         <a:buFont typeface="Arial" panose="020B0604020202020204" pitchFamily="34" charset="0"/>
         <a:buChar char="•"/>
-        <a:defRPr sz="1417" kern="1200">
+        <a:defRPr sz="1606" kern="1200">
           <a:solidFill>
             <a:schemeClr val="tx1"/>
           </a:solidFill>
@@ -2793,16 +2793,16 @@
           <a:cs typeface="+mn-cs"/>
         </a:defRPr>
       </a:lvl5pPr>
-      <a:lvl6pPr marL="1979745" indent="-179977" algn="l" defTabSz="719907" rtl="0" eaLnBrk="1" latinLnBrk="0" hangingPunct="1">
+      <a:lvl6pPr marL="2244029" indent="-204003" algn="l" defTabSz="816011" rtl="0" eaLnBrk="1" latinLnBrk="0" hangingPunct="1">
         <a:lnSpc>
           <a:spcPct val="90000"/>
         </a:lnSpc>
         <a:spcBef>
-          <a:spcPts val="394"/>
+          <a:spcPts val="446"/>
         </a:spcBef>
         <a:buFont typeface="Arial" panose="020B0604020202020204" pitchFamily="34" charset="0"/>
         <a:buChar char="•"/>
-        <a:defRPr sz="1417" kern="1200">
+        <a:defRPr sz="1606" kern="1200">
           <a:solidFill>
             <a:schemeClr val="tx1"/>
           </a:solidFill>
@@ -2811,16 +2811,16 @@
           <a:cs typeface="+mn-cs"/>
         </a:defRPr>
       </a:lvl6pPr>
-      <a:lvl7pPr marL="2339698" indent="-179977" algn="l" defTabSz="719907" rtl="0" eaLnBrk="1" latinLnBrk="0" hangingPunct="1">
+      <a:lvl7pPr marL="2652034" indent="-204003" algn="l" defTabSz="816011" rtl="0" eaLnBrk="1" latinLnBrk="0" hangingPunct="1">
         <a:lnSpc>
           <a:spcPct val="90000"/>
         </a:lnSpc>
         <a:spcBef>
-          <a:spcPts val="394"/>
+          <a:spcPts val="446"/>
         </a:spcBef>
         <a:buFont typeface="Arial" panose="020B0604020202020204" pitchFamily="34" charset="0"/>
         <a:buChar char="•"/>
-        <a:defRPr sz="1417" kern="1200">
+        <a:defRPr sz="1606" kern="1200">
           <a:solidFill>
             <a:schemeClr val="tx1"/>
           </a:solidFill>
@@ -2829,16 +2829,16 @@
           <a:cs typeface="+mn-cs"/>
         </a:defRPr>
       </a:lvl7pPr>
-      <a:lvl8pPr marL="2699652" indent="-179977" algn="l" defTabSz="719907" rtl="0" eaLnBrk="1" latinLnBrk="0" hangingPunct="1">
+      <a:lvl8pPr marL="3060040" indent="-204003" algn="l" defTabSz="816011" rtl="0" eaLnBrk="1" latinLnBrk="0" hangingPunct="1">
         <a:lnSpc>
           <a:spcPct val="90000"/>
         </a:lnSpc>
         <a:spcBef>
-          <a:spcPts val="394"/>
+          <a:spcPts val="446"/>
         </a:spcBef>
         <a:buFont typeface="Arial" panose="020B0604020202020204" pitchFamily="34" charset="0"/>
         <a:buChar char="•"/>
-        <a:defRPr sz="1417" kern="1200">
+        <a:defRPr sz="1606" kern="1200">
           <a:solidFill>
             <a:schemeClr val="tx1"/>
           </a:solidFill>
@@ -2847,16 +2847,16 @@
           <a:cs typeface="+mn-cs"/>
         </a:defRPr>
       </a:lvl8pPr>
-      <a:lvl9pPr marL="3059605" indent="-179977" algn="l" defTabSz="719907" rtl="0" eaLnBrk="1" latinLnBrk="0" hangingPunct="1">
+      <a:lvl9pPr marL="3468045" indent="-204003" algn="l" defTabSz="816011" rtl="0" eaLnBrk="1" latinLnBrk="0" hangingPunct="1">
         <a:lnSpc>
           <a:spcPct val="90000"/>
         </a:lnSpc>
         <a:spcBef>
-          <a:spcPts val="394"/>
+          <a:spcPts val="446"/>
         </a:spcBef>
         <a:buFont typeface="Arial" panose="020B0604020202020204" pitchFamily="34" charset="0"/>
         <a:buChar char="•"/>
-        <a:defRPr sz="1417" kern="1200">
+        <a:defRPr sz="1606" kern="1200">
           <a:solidFill>
             <a:schemeClr val="tx1"/>
           </a:solidFill>
@@ -2870,8 +2870,8 @@
       <a:defPPr>
         <a:defRPr lang="en-US"/>
       </a:defPPr>
-      <a:lvl1pPr marL="0" algn="l" defTabSz="719907" rtl="0" eaLnBrk="1" latinLnBrk="0" hangingPunct="1">
-        <a:defRPr sz="1417" kern="1200">
+      <a:lvl1pPr marL="0" algn="l" defTabSz="816011" rtl="0" eaLnBrk="1" latinLnBrk="0" hangingPunct="1">
+        <a:defRPr sz="1606" kern="1200">
           <a:solidFill>
             <a:schemeClr val="tx1"/>
           </a:solidFill>
@@ -2880,8 +2880,8 @@
           <a:cs typeface="+mn-cs"/>
         </a:defRPr>
       </a:lvl1pPr>
-      <a:lvl2pPr marL="359954" algn="l" defTabSz="719907" rtl="0" eaLnBrk="1" latinLnBrk="0" hangingPunct="1">
-        <a:defRPr sz="1417" kern="1200">
+      <a:lvl2pPr marL="408005" algn="l" defTabSz="816011" rtl="0" eaLnBrk="1" latinLnBrk="0" hangingPunct="1">
+        <a:defRPr sz="1606" kern="1200">
           <a:solidFill>
             <a:schemeClr val="tx1"/>
           </a:solidFill>
@@ -2890,8 +2890,8 @@
           <a:cs typeface="+mn-cs"/>
         </a:defRPr>
       </a:lvl2pPr>
-      <a:lvl3pPr marL="719907" algn="l" defTabSz="719907" rtl="0" eaLnBrk="1" latinLnBrk="0" hangingPunct="1">
-        <a:defRPr sz="1417" kern="1200">
+      <a:lvl3pPr marL="816011" algn="l" defTabSz="816011" rtl="0" eaLnBrk="1" latinLnBrk="0" hangingPunct="1">
+        <a:defRPr sz="1606" kern="1200">
           <a:solidFill>
             <a:schemeClr val="tx1"/>
           </a:solidFill>
@@ -2900,8 +2900,8 @@
           <a:cs typeface="+mn-cs"/>
         </a:defRPr>
       </a:lvl3pPr>
-      <a:lvl4pPr marL="1079861" algn="l" defTabSz="719907" rtl="0" eaLnBrk="1" latinLnBrk="0" hangingPunct="1">
-        <a:defRPr sz="1417" kern="1200">
+      <a:lvl4pPr marL="1224016" algn="l" defTabSz="816011" rtl="0" eaLnBrk="1" latinLnBrk="0" hangingPunct="1">
+        <a:defRPr sz="1606" kern="1200">
           <a:solidFill>
             <a:schemeClr val="tx1"/>
           </a:solidFill>
@@ -2910,8 +2910,8 @@
           <a:cs typeface="+mn-cs"/>
         </a:defRPr>
       </a:lvl4pPr>
-      <a:lvl5pPr marL="1439814" algn="l" defTabSz="719907" rtl="0" eaLnBrk="1" latinLnBrk="0" hangingPunct="1">
-        <a:defRPr sz="1417" kern="1200">
+      <a:lvl5pPr marL="1632021" algn="l" defTabSz="816011" rtl="0" eaLnBrk="1" latinLnBrk="0" hangingPunct="1">
+        <a:defRPr sz="1606" kern="1200">
           <a:solidFill>
             <a:schemeClr val="tx1"/>
           </a:solidFill>
@@ -2920,8 +2920,8 @@
           <a:cs typeface="+mn-cs"/>
         </a:defRPr>
       </a:lvl5pPr>
-      <a:lvl6pPr marL="1799768" algn="l" defTabSz="719907" rtl="0" eaLnBrk="1" latinLnBrk="0" hangingPunct="1">
-        <a:defRPr sz="1417" kern="1200">
+      <a:lvl6pPr marL="2040026" algn="l" defTabSz="816011" rtl="0" eaLnBrk="1" latinLnBrk="0" hangingPunct="1">
+        <a:defRPr sz="1606" kern="1200">
           <a:solidFill>
             <a:schemeClr val="tx1"/>
           </a:solidFill>
@@ -2930,8 +2930,8 @@
           <a:cs typeface="+mn-cs"/>
         </a:defRPr>
       </a:lvl6pPr>
-      <a:lvl7pPr marL="2159721" algn="l" defTabSz="719907" rtl="0" eaLnBrk="1" latinLnBrk="0" hangingPunct="1">
-        <a:defRPr sz="1417" kern="1200">
+      <a:lvl7pPr marL="2448032" algn="l" defTabSz="816011" rtl="0" eaLnBrk="1" latinLnBrk="0" hangingPunct="1">
+        <a:defRPr sz="1606" kern="1200">
           <a:solidFill>
             <a:schemeClr val="tx1"/>
           </a:solidFill>
@@ -2940,8 +2940,8 @@
           <a:cs typeface="+mn-cs"/>
         </a:defRPr>
       </a:lvl7pPr>
-      <a:lvl8pPr marL="2519675" algn="l" defTabSz="719907" rtl="0" eaLnBrk="1" latinLnBrk="0" hangingPunct="1">
-        <a:defRPr sz="1417" kern="1200">
+      <a:lvl8pPr marL="2856037" algn="l" defTabSz="816011" rtl="0" eaLnBrk="1" latinLnBrk="0" hangingPunct="1">
+        <a:defRPr sz="1606" kern="1200">
           <a:solidFill>
             <a:schemeClr val="tx1"/>
           </a:solidFill>
@@ -2950,8 +2950,8 @@
           <a:cs typeface="+mn-cs"/>
         </a:defRPr>
       </a:lvl8pPr>
-      <a:lvl9pPr marL="2879628" algn="l" defTabSz="719907" rtl="0" eaLnBrk="1" latinLnBrk="0" hangingPunct="1">
-        <a:defRPr sz="1417" kern="1200">
+      <a:lvl9pPr marL="3264042" algn="l" defTabSz="816011" rtl="0" eaLnBrk="1" latinLnBrk="0" hangingPunct="1">
+        <a:defRPr sz="1606" kern="1200">
           <a:solidFill>
             <a:schemeClr val="tx1"/>
           </a:solidFill>
@@ -2990,7 +2990,7 @@
         </p:nvSpPr>
         <p:spPr>
           <a:xfrm>
-            <a:off x="719375" y="2559572"/>
+            <a:off x="257827" y="2559572"/>
             <a:ext cx="1948050" cy="1002256"/>
           </a:xfrm>
           <a:prstGeom prst="roundRect">
@@ -3053,7 +3053,7 @@
         </p:nvSpPr>
         <p:spPr>
           <a:xfrm>
-            <a:off x="4507248" y="2559572"/>
+            <a:off x="4045700" y="2559572"/>
             <a:ext cx="1510446" cy="1002256"/>
           </a:xfrm>
           <a:prstGeom prst="roundRect">
@@ -3114,7 +3114,7 @@
         </p:nvSpPr>
         <p:spPr>
           <a:xfrm>
-            <a:off x="4507248" y="4305287"/>
+            <a:off x="4045700" y="4305287"/>
             <a:ext cx="1510446" cy="1002256"/>
           </a:xfrm>
           <a:prstGeom prst="roundRect">
@@ -3169,7 +3169,7 @@
         </p:nvSpPr>
         <p:spPr>
           <a:xfrm>
-            <a:off x="4507248" y="813857"/>
+            <a:off x="4045700" y="813857"/>
             <a:ext cx="1510446" cy="1002256"/>
           </a:xfrm>
           <a:prstGeom prst="roundRect">
@@ -3233,7 +3233,7 @@
         </p:nvCxnSpPr>
         <p:spPr>
           <a:xfrm flipV="1">
-            <a:off x="2667425" y="1314986"/>
+            <a:off x="2205877" y="1314986"/>
             <a:ext cx="1839822" cy="1745716"/>
           </a:xfrm>
           <a:prstGeom prst="straightConnector1">
@@ -3269,7 +3269,7 @@
         </p:nvCxnSpPr>
         <p:spPr>
           <a:xfrm>
-            <a:off x="2667425" y="3060699"/>
+            <a:off x="2205877" y="3060699"/>
             <a:ext cx="1839822" cy="0"/>
           </a:xfrm>
           <a:prstGeom prst="straightConnector1">
@@ -3305,7 +3305,7 @@
         </p:nvCxnSpPr>
         <p:spPr>
           <a:xfrm>
-            <a:off x="2667425" y="3060699"/>
+            <a:off x="2205877" y="3060700"/>
             <a:ext cx="1839822" cy="1745719"/>
           </a:xfrm>
           <a:prstGeom prst="straightConnector1">
@@ -3338,7 +3338,7 @@
         </p:nvSpPr>
         <p:spPr>
           <a:xfrm>
-            <a:off x="2865539" y="1317582"/>
+            <a:off x="2403991" y="1317582"/>
             <a:ext cx="1354858" cy="415498"/>
           </a:xfrm>
           <a:prstGeom prst="rect">
@@ -3371,7 +3371,7 @@
         </p:nvSpPr>
         <p:spPr>
           <a:xfrm>
-            <a:off x="2914431" y="2673472"/>
+            <a:off x="2452883" y="2673472"/>
             <a:ext cx="1600118" cy="415498"/>
           </a:xfrm>
           <a:prstGeom prst="rect">
@@ -3404,7 +3404,7 @@
         </p:nvSpPr>
         <p:spPr>
           <a:xfrm>
-            <a:off x="2959512" y="4245092"/>
+            <a:off x="2497965" y="4245092"/>
             <a:ext cx="1074333" cy="415498"/>
           </a:xfrm>
           <a:prstGeom prst="rect">
@@ -3434,6 +3434,297 @@
               </a:rPr>
               <a:t> push</a:t>
             </a:r>
+          </a:p>
+        </p:txBody>
+      </p:sp>
+      <p:sp>
+        <p:nvSpPr>
+          <p:cNvPr id="24" name="TextBox 23"/>
+          <p:cNvSpPr txBox="1"/>
+          <p:nvPr/>
+        </p:nvSpPr>
+        <p:spPr>
+          <a:xfrm>
+            <a:off x="5556146" y="853320"/>
+            <a:ext cx="3632726" cy="461665"/>
+          </a:xfrm>
+          <a:prstGeom prst="rect">
+            <a:avLst/>
+          </a:prstGeom>
+          <a:noFill/>
+        </p:spPr>
+        <p:txBody>
+          <a:bodyPr wrap="none" rtlCol="0">
+            <a:spAutoFit/>
+          </a:bodyPr>
+          <a:lstStyle/>
+          <a:p>
+            <a:pPr marL="285750" indent="-285750">
+              <a:buFont typeface="Arial" charset="0"/>
+              <a:buChar char="•"/>
+            </a:pPr>
+            <a:r>
+              <a:rPr lang="en-US" sz="1200" dirty="0" smtClean="0">
+                <a:latin typeface="Apple SD Gothic Neo Light" charset="-127"/>
+                <a:ea typeface="Apple SD Gothic Neo Light" charset="-127"/>
+                <a:cs typeface="Apple SD Gothic Neo Light" charset="-127"/>
+              </a:rPr>
+              <a:t>Rebuild the server.</a:t>
+            </a:r>
+          </a:p>
+          <a:p>
+            <a:pPr marL="285750" indent="-285750">
+              <a:buFont typeface="Arial" charset="0"/>
+              <a:buChar char="•"/>
+            </a:pPr>
+            <a:r>
+              <a:rPr lang="en-US" sz="1200" dirty="0" smtClean="0">
+                <a:latin typeface="Apple SD Gothic Neo Light" charset="-127"/>
+                <a:ea typeface="Apple SD Gothic Neo Light" charset="-127"/>
+                <a:cs typeface="Apple SD Gothic Neo Light" charset="-127"/>
+              </a:rPr>
+              <a:t>Restart </a:t>
+            </a:r>
+            <a:r>
+              <a:rPr lang="en-US" sz="1200" dirty="0" err="1" smtClean="0">
+                <a:latin typeface="Consolas" charset="0"/>
+                <a:ea typeface="Consolas" charset="0"/>
+                <a:cs typeface="Consolas" charset="0"/>
+              </a:rPr>
+              <a:t>terrace.service</a:t>
+            </a:r>
+            <a:r>
+              <a:rPr lang="en-US" sz="1200" dirty="0" smtClean="0">
+                <a:latin typeface="Apple SD Gothic Neo Light" charset="-127"/>
+                <a:ea typeface="Apple SD Gothic Neo Light" charset="-127"/>
+                <a:cs typeface="Apple SD Gothic Neo Light" charset="-127"/>
+              </a:rPr>
+              <a:t> to run a new server</a:t>
+            </a:r>
+            <a:endParaRPr lang="en-US" sz="1200" dirty="0">
+              <a:latin typeface="Apple SD Gothic Neo Light" charset="-127"/>
+              <a:ea typeface="Apple SD Gothic Neo Light" charset="-127"/>
+              <a:cs typeface="Apple SD Gothic Neo Light" charset="-127"/>
+            </a:endParaRPr>
+          </a:p>
+        </p:txBody>
+      </p:sp>
+      <p:sp>
+        <p:nvSpPr>
+          <p:cNvPr id="25" name="TextBox 24"/>
+          <p:cNvSpPr txBox="1"/>
+          <p:nvPr/>
+        </p:nvSpPr>
+        <p:spPr>
+          <a:xfrm>
+            <a:off x="5556146" y="2460535"/>
+            <a:ext cx="3512500" cy="1200329"/>
+          </a:xfrm>
+          <a:prstGeom prst="rect">
+            <a:avLst/>
+          </a:prstGeom>
+          <a:noFill/>
+        </p:spPr>
+        <p:txBody>
+          <a:bodyPr wrap="none" rtlCol="0">
+            <a:spAutoFit/>
+          </a:bodyPr>
+          <a:lstStyle/>
+          <a:p>
+            <a:pPr marL="285750" indent="-285750">
+              <a:buFont typeface="Arial" charset="0"/>
+              <a:buChar char="•"/>
+            </a:pPr>
+            <a:r>
+              <a:rPr lang="en-US" sz="1200" dirty="0" smtClean="0">
+                <a:latin typeface="Apple SD Gothic Neo Light" charset="-127"/>
+                <a:ea typeface="Apple SD Gothic Neo Light" charset="-127"/>
+                <a:cs typeface="Apple SD Gothic Neo Light" charset="-127"/>
+              </a:rPr>
+              <a:t>push a commit from local dev </a:t>
+            </a:r>
+            <a:r>
+              <a:rPr lang="en-US" sz="1200" dirty="0" err="1" smtClean="0">
+                <a:latin typeface="Apple SD Gothic Neo Light" charset="-127"/>
+                <a:ea typeface="Apple SD Gothic Neo Light" charset="-127"/>
+                <a:cs typeface="Apple SD Gothic Neo Light" charset="-127"/>
+              </a:rPr>
+              <a:t>envorinment</a:t>
+            </a:r>
+            <a:r>
+              <a:rPr lang="en-US" sz="1200" dirty="0">
+                <a:latin typeface="Apple SD Gothic Neo Light" charset="-127"/>
+                <a:ea typeface="Apple SD Gothic Neo Light" charset="-127"/>
+                <a:cs typeface="Apple SD Gothic Neo Light" charset="-127"/>
+              </a:rPr>
+              <a:t/>
+            </a:r>
+            <a:br>
+              <a:rPr lang="en-US" sz="1200" dirty="0">
+                <a:latin typeface="Apple SD Gothic Neo Light" charset="-127"/>
+                <a:ea typeface="Apple SD Gothic Neo Light" charset="-127"/>
+                <a:cs typeface="Apple SD Gothic Neo Light" charset="-127"/>
+              </a:rPr>
+            </a:br>
+            <a:r>
+              <a:rPr lang="en-US" sz="1200" dirty="0" smtClean="0">
+                <a:latin typeface="Apple SD Gothic Neo Light" charset="-127"/>
+                <a:ea typeface="Apple SD Gothic Neo Light" charset="-127"/>
+                <a:cs typeface="Apple SD Gothic Neo Light" charset="-127"/>
+              </a:rPr>
+              <a:t>to the remote server.</a:t>
+            </a:r>
+          </a:p>
+          <a:p>
+            <a:pPr marL="285750" indent="-285750">
+              <a:buFont typeface="Arial" charset="0"/>
+              <a:buChar char="•"/>
+            </a:pPr>
+            <a:r>
+              <a:rPr lang="en-US" sz="1200" dirty="0" smtClean="0">
+                <a:latin typeface="Consolas" charset="0"/>
+                <a:ea typeface="Consolas" charset="0"/>
+                <a:cs typeface="Consolas" charset="0"/>
+              </a:rPr>
+              <a:t>post-receive</a:t>
+            </a:r>
+            <a:r>
+              <a:rPr lang="en-US" sz="1200" dirty="0" smtClean="0">
+                <a:latin typeface="Apple SD Gothic Neo Light" charset="-127"/>
+                <a:ea typeface="Apple SD Gothic Neo Light" charset="-127"/>
+                <a:cs typeface="Apple SD Gothic Neo Light" charset="-127"/>
+              </a:rPr>
+              <a:t> hook catches the commit and</a:t>
+            </a:r>
+            <a:br>
+              <a:rPr lang="en-US" sz="1200" dirty="0" smtClean="0">
+                <a:latin typeface="Apple SD Gothic Neo Light" charset="-127"/>
+                <a:ea typeface="Apple SD Gothic Neo Light" charset="-127"/>
+                <a:cs typeface="Apple SD Gothic Neo Light" charset="-127"/>
+              </a:rPr>
+            </a:br>
+            <a:r>
+              <a:rPr lang="en-US" sz="1200" dirty="0" smtClean="0">
+                <a:latin typeface="Apple SD Gothic Neo Light" charset="-127"/>
+                <a:ea typeface="Apple SD Gothic Neo Light" charset="-127"/>
+                <a:cs typeface="Apple SD Gothic Neo Light" charset="-127"/>
+              </a:rPr>
+              <a:t>run a deploy script.</a:t>
+            </a:r>
+          </a:p>
+          <a:p>
+            <a:pPr marL="285750" indent="-285750">
+              <a:buFont typeface="Arial" charset="0"/>
+              <a:buChar char="•"/>
+            </a:pPr>
+            <a:r>
+              <a:rPr lang="en-US" sz="1200" dirty="0" smtClean="0">
+                <a:latin typeface="Apple SD Gothic Neo Light" charset="-127"/>
+                <a:ea typeface="Apple SD Gothic Neo Light" charset="-127"/>
+                <a:cs typeface="Apple SD Gothic Neo Light" charset="-127"/>
+              </a:rPr>
+              <a:t>Rebuild the server.</a:t>
+            </a:r>
+          </a:p>
+          <a:p>
+            <a:pPr marL="285750" indent="-285750">
+              <a:buFont typeface="Arial" charset="0"/>
+              <a:buChar char="•"/>
+            </a:pPr>
+            <a:r>
+              <a:rPr lang="en-US" sz="1200" dirty="0" smtClean="0">
+                <a:latin typeface="Apple SD Gothic Neo Light" charset="-127"/>
+                <a:ea typeface="Apple SD Gothic Neo Light" charset="-127"/>
+                <a:cs typeface="Apple SD Gothic Neo Light" charset="-127"/>
+              </a:rPr>
+              <a:t>Restart </a:t>
+            </a:r>
+            <a:r>
+              <a:rPr lang="en-US" sz="1200" dirty="0" err="1" smtClean="0">
+                <a:latin typeface="Consolas" charset="0"/>
+                <a:ea typeface="Consolas" charset="0"/>
+                <a:cs typeface="Consolas" charset="0"/>
+              </a:rPr>
+              <a:t>terrace.service</a:t>
+            </a:r>
+            <a:r>
+              <a:rPr lang="en-US" sz="1200" dirty="0" smtClean="0">
+                <a:latin typeface="Apple SD Gothic Neo Light" charset="-127"/>
+                <a:ea typeface="Apple SD Gothic Neo Light" charset="-127"/>
+                <a:cs typeface="Apple SD Gothic Neo Light" charset="-127"/>
+              </a:rPr>
+              <a:t> to run a new server</a:t>
+            </a:r>
+            <a:endParaRPr lang="en-US" sz="1200" dirty="0">
+              <a:latin typeface="Apple SD Gothic Neo Light" charset="-127"/>
+              <a:ea typeface="Apple SD Gothic Neo Light" charset="-127"/>
+              <a:cs typeface="Apple SD Gothic Neo Light" charset="-127"/>
+            </a:endParaRPr>
+          </a:p>
+        </p:txBody>
+      </p:sp>
+      <p:sp>
+        <p:nvSpPr>
+          <p:cNvPr id="26" name="TextBox 25"/>
+          <p:cNvSpPr txBox="1"/>
+          <p:nvPr/>
+        </p:nvSpPr>
+        <p:spPr>
+          <a:xfrm>
+            <a:off x="5556146" y="4575581"/>
+            <a:ext cx="3108543" cy="461665"/>
+          </a:xfrm>
+          <a:prstGeom prst="rect">
+            <a:avLst/>
+          </a:prstGeom>
+          <a:noFill/>
+        </p:spPr>
+        <p:txBody>
+          <a:bodyPr wrap="none" rtlCol="0">
+            <a:spAutoFit/>
+          </a:bodyPr>
+          <a:lstStyle/>
+          <a:p>
+            <a:pPr marL="285750" indent="-285750">
+              <a:buFont typeface="Arial" charset="0"/>
+              <a:buChar char="•"/>
+            </a:pPr>
+            <a:r>
+              <a:rPr lang="en-US" sz="1200" dirty="0" err="1" smtClean="0">
+                <a:latin typeface="Apple SD Gothic Neo Light" charset="-127"/>
+                <a:ea typeface="Apple SD Gothic Neo Light" charset="-127"/>
+                <a:cs typeface="Apple SD Gothic Neo Light" charset="-127"/>
+              </a:rPr>
+              <a:t>github</a:t>
+            </a:r>
+            <a:r>
+              <a:rPr lang="en-US" sz="1200" dirty="0" smtClean="0">
+                <a:latin typeface="Apple SD Gothic Neo Light" charset="-127"/>
+                <a:ea typeface="Apple SD Gothic Neo Light" charset="-127"/>
+                <a:cs typeface="Apple SD Gothic Neo Light" charset="-127"/>
+              </a:rPr>
+              <a:t> is just for a backup. It doesn’t have</a:t>
+            </a:r>
+            <a:br>
+              <a:rPr lang="en-US" sz="1200" dirty="0" smtClean="0">
+                <a:latin typeface="Apple SD Gothic Neo Light" charset="-127"/>
+                <a:ea typeface="Apple SD Gothic Neo Light" charset="-127"/>
+                <a:cs typeface="Apple SD Gothic Neo Light" charset="-127"/>
+              </a:rPr>
+            </a:br>
+            <a:r>
+              <a:rPr lang="en-US" sz="1200" dirty="0" smtClean="0">
+                <a:latin typeface="Apple SD Gothic Neo Light" charset="-127"/>
+                <a:ea typeface="Apple SD Gothic Neo Light" charset="-127"/>
+                <a:cs typeface="Apple SD Gothic Neo Light" charset="-127"/>
+              </a:rPr>
+              <a:t>any effect to the server operation</a:t>
+            </a:r>
+            <a:endParaRPr lang="en-US" sz="1200" dirty="0">
+              <a:latin typeface="Apple SD Gothic Neo Light" charset="-127"/>
+              <a:ea typeface="Apple SD Gothic Neo Light" charset="-127"/>
+              <a:cs typeface="Apple SD Gothic Neo Light" charset="-127"/>
+            </a:endParaRPr>
           </a:p>
         </p:txBody>
       </p:sp>

</xml_diff>